<commit_message>
fix small thing in the TD code
</commit_message>
<xml_diff>
--- a/Tutorials/whatiswot/13-Thing_Description/13-Thing_Description.pptx
+++ b/Tutorials/whatiswot/13-Thing_Description/13-Thing_Description.pptx
@@ -236,7 +236,7 @@
           <a:p>
             <a:fld id="{FD65C6DA-5C8D-412A-A384-5B74A29C9C75}" type="datetimeFigureOut">
               <a:rPr lang="en-US" smtClean="0"/>
-              <a:t>10/16/23</a:t>
+              <a:t>10/17/23</a:t>
             </a:fld>
             <a:endParaRPr lang="en-US"/>
           </a:p>
@@ -3900,7 +3900,7 @@
           <a:p>
             <a:fld id="{D154F9CB-E3D7-441A-A1FF-5C1CDFA7D5B3}" type="datetimeFigureOut">
               <a:rPr lang="en-US" smtClean="0"/>
-              <a:t>10/16/23</a:t>
+              <a:t>10/17/23</a:t>
             </a:fld>
             <a:endParaRPr lang="en-US"/>
           </a:p>
@@ -4070,7 +4070,7 @@
           <a:p>
             <a:fld id="{D154F9CB-E3D7-441A-A1FF-5C1CDFA7D5B3}" type="datetimeFigureOut">
               <a:rPr lang="en-US" smtClean="0"/>
-              <a:t>10/16/23</a:t>
+              <a:t>10/17/23</a:t>
             </a:fld>
             <a:endParaRPr lang="en-US"/>
           </a:p>
@@ -4250,7 +4250,7 @@
           <a:p>
             <a:fld id="{D154F9CB-E3D7-441A-A1FF-5C1CDFA7D5B3}" type="datetimeFigureOut">
               <a:rPr lang="en-US" smtClean="0"/>
-              <a:t>10/16/23</a:t>
+              <a:t>10/17/23</a:t>
             </a:fld>
             <a:endParaRPr lang="en-US"/>
           </a:p>
@@ -4420,7 +4420,7 @@
           <a:p>
             <a:fld id="{D154F9CB-E3D7-441A-A1FF-5C1CDFA7D5B3}" type="datetimeFigureOut">
               <a:rPr lang="en-US" smtClean="0"/>
-              <a:t>10/16/23</a:t>
+              <a:t>10/17/23</a:t>
             </a:fld>
             <a:endParaRPr lang="en-US"/>
           </a:p>
@@ -4666,7 +4666,7 @@
           <a:p>
             <a:fld id="{D154F9CB-E3D7-441A-A1FF-5C1CDFA7D5B3}" type="datetimeFigureOut">
               <a:rPr lang="en-US" smtClean="0"/>
-              <a:t>10/16/23</a:t>
+              <a:t>10/17/23</a:t>
             </a:fld>
             <a:endParaRPr lang="en-US"/>
           </a:p>
@@ -4898,7 +4898,7 @@
           <a:p>
             <a:fld id="{D154F9CB-E3D7-441A-A1FF-5C1CDFA7D5B3}" type="datetimeFigureOut">
               <a:rPr lang="en-US" smtClean="0"/>
-              <a:t>10/16/23</a:t>
+              <a:t>10/17/23</a:t>
             </a:fld>
             <a:endParaRPr lang="en-US"/>
           </a:p>
@@ -5265,7 +5265,7 @@
           <a:p>
             <a:fld id="{D154F9CB-E3D7-441A-A1FF-5C1CDFA7D5B3}" type="datetimeFigureOut">
               <a:rPr lang="en-US" smtClean="0"/>
-              <a:t>10/16/23</a:t>
+              <a:t>10/17/23</a:t>
             </a:fld>
             <a:endParaRPr lang="en-US"/>
           </a:p>
@@ -5383,7 +5383,7 @@
           <a:p>
             <a:fld id="{D154F9CB-E3D7-441A-A1FF-5C1CDFA7D5B3}" type="datetimeFigureOut">
               <a:rPr lang="en-US" smtClean="0"/>
-              <a:t>10/16/23</a:t>
+              <a:t>10/17/23</a:t>
             </a:fld>
             <a:endParaRPr lang="en-US"/>
           </a:p>
@@ -5478,7 +5478,7 @@
           <a:p>
             <a:fld id="{D154F9CB-E3D7-441A-A1FF-5C1CDFA7D5B3}" type="datetimeFigureOut">
               <a:rPr lang="en-US" smtClean="0"/>
-              <a:t>10/16/23</a:t>
+              <a:t>10/17/23</a:t>
             </a:fld>
             <a:endParaRPr lang="en-US"/>
           </a:p>
@@ -5755,7 +5755,7 @@
           <a:p>
             <a:fld id="{D154F9CB-E3D7-441A-A1FF-5C1CDFA7D5B3}" type="datetimeFigureOut">
               <a:rPr lang="en-US" smtClean="0"/>
-              <a:t>10/16/23</a:t>
+              <a:t>10/17/23</a:t>
             </a:fld>
             <a:endParaRPr lang="en-US"/>
           </a:p>
@@ -6011,7 +6011,7 @@
           <a:p>
             <a:fld id="{D154F9CB-E3D7-441A-A1FF-5C1CDFA7D5B3}" type="datetimeFigureOut">
               <a:rPr lang="en-US" smtClean="0"/>
-              <a:t>10/16/23</a:t>
+              <a:t>10/17/23</a:t>
             </a:fld>
             <a:endParaRPr lang="en-US"/>
           </a:p>
@@ -6229,7 +6229,7 @@
           <a:p>
             <a:fld id="{D154F9CB-E3D7-441A-A1FF-5C1CDFA7D5B3}" type="datetimeFigureOut">
               <a:rPr lang="en-US" smtClean="0"/>
-              <a:t>10/16/23</a:t>
+              <a:t>10/17/23</a:t>
             </a:fld>
             <a:endParaRPr lang="en-US"/>
           </a:p>
@@ -10602,6 +10602,59 @@
                                         <p:cTn id="59" dur="500"/>
                                         <p:tgtEl>
                                           <p:spTgt spid="17"/>
+                                        </p:tgtEl>
+                                      </p:cBhvr>
+                                    </p:animEffect>
+                                  </p:childTnLst>
+                                </p:cTn>
+                              </p:par>
+                            </p:childTnLst>
+                          </p:cTn>
+                        </p:par>
+                      </p:childTnLst>
+                    </p:cTn>
+                  </p:par>
+                  <p:par>
+                    <p:cTn id="60" fill="hold">
+                      <p:stCondLst>
+                        <p:cond delay="indefinite"/>
+                      </p:stCondLst>
+                      <p:childTnLst>
+                        <p:par>
+                          <p:cTn id="61" fill="hold">
+                            <p:stCondLst>
+                              <p:cond delay="0"/>
+                            </p:stCondLst>
+                            <p:childTnLst>
+                              <p:par>
+                                <p:cTn id="62" presetID="22" presetClass="entr" presetSubtype="8" fill="hold" nodeType="clickEffect">
+                                  <p:stCondLst>
+                                    <p:cond delay="0"/>
+                                  </p:stCondLst>
+                                  <p:childTnLst>
+                                    <p:set>
+                                      <p:cBhvr>
+                                        <p:cTn id="63" dur="1" fill="hold">
+                                          <p:stCondLst>
+                                            <p:cond delay="0"/>
+                                          </p:stCondLst>
+                                        </p:cTn>
+                                        <p:tgtEl>
+                                          <p:spTgt spid="3"/>
+                                        </p:tgtEl>
+                                        <p:attrNameLst>
+                                          <p:attrName>style.visibility</p:attrName>
+                                        </p:attrNameLst>
+                                      </p:cBhvr>
+                                      <p:to>
+                                        <p:strVal val="visible"/>
+                                      </p:to>
+                                    </p:set>
+                                    <p:animEffect transition="in" filter="wipe(left)">
+                                      <p:cBhvr>
+                                        <p:cTn id="64" dur="500"/>
+                                        <p:tgtEl>
+                                          <p:spTgt spid="3"/>
                                         </p:tgtEl>
                                       </p:cBhvr>
                                     </p:animEffect>
@@ -18844,10 +18897,20 @@
                 <a:latin typeface="Consolas" panose="020B0609020204030204" pitchFamily="49" charset="0"/>
                 <a:cs typeface="Consolas" panose="020B0609020204030204" pitchFamily="49" charset="0"/>
               </a:rPr>
-              <a:t>"urn:uuid:0804d572-cce8-422a-bb7c-4412fcd56f06"</a:t>
+              <a:t>"urn:uuid:0804d572-cce8-422a-bb7c-4412fcd56f06</a:t>
             </a:r>
             <a:r>
-              <a:rPr lang="en-US" sz="1600" dirty="0">
+              <a:rPr lang="en-US" sz="1600">
+                <a:solidFill>
+                  <a:schemeClr val="accent2"/>
+                </a:solidFill>
+                <a:latin typeface="Consolas" panose="020B0609020204030204" pitchFamily="49" charset="0"/>
+                <a:cs typeface="Consolas" panose="020B0609020204030204" pitchFamily="49" charset="0"/>
+              </a:rPr>
+              <a:t>"</a:t>
+            </a:r>
+            <a:r>
+              <a:rPr lang="en-US" sz="1600">
                 <a:solidFill>
                   <a:schemeClr val="accent1"/>
                 </a:solidFill>
@@ -18857,7 +18920,7 @@
               <a:t>,</a:t>
             </a:r>
             <a:r>
-              <a:rPr lang="en-US" sz="1600" dirty="0">
+              <a:rPr lang="en-US" sz="1600">
                 <a:solidFill>
                   <a:srgbClr val="CACACA"/>
                 </a:solidFill>
@@ -18866,16 +18929,13 @@
               </a:rPr>
               <a:t> </a:t>
             </a:r>
-            <a:r>
-              <a:rPr lang="en-US" sz="1600" dirty="0">
-                <a:solidFill>
-                  <a:srgbClr val="FF0000"/>
-                </a:solidFill>
-                <a:latin typeface="Consolas" panose="020B0609020204030204" pitchFamily="49" charset="0"/>
-                <a:cs typeface="Consolas" panose="020B0609020204030204" pitchFamily="49" charset="0"/>
-              </a:rPr>
-              <a:t>//ask about this</a:t>
-            </a:r>
+            <a:endParaRPr lang="en-US" sz="1600" dirty="0">
+              <a:solidFill>
+                <a:srgbClr val="FF0000"/>
+              </a:solidFill>
+              <a:latin typeface="Consolas" panose="020B0609020204030204" pitchFamily="49" charset="0"/>
+              <a:cs typeface="Consolas" panose="020B0609020204030204" pitchFamily="49" charset="0"/>
+            </a:endParaRPr>
           </a:p>
           <a:p>
             <a:pPr marL="0" indent="0">
@@ -19583,7 +19643,7 @@
         </p:nvSpPr>
         <p:spPr>
           <a:xfrm>
-            <a:off x="1467195" y="3225338"/>
+            <a:off x="1467196" y="3225339"/>
             <a:ext cx="9257609" cy="407323"/>
           </a:xfrm>
         </p:spPr>
@@ -29923,7 +29983,7 @@
         </p:nvGrpSpPr>
         <p:grpSpPr>
           <a:xfrm>
-            <a:off x="5785662" y="3625184"/>
+            <a:off x="5788050" y="3655033"/>
             <a:ext cx="478116" cy="211758"/>
             <a:chOff x="5965542" y="3625184"/>
             <a:chExt cx="478116" cy="211758"/>

</xml_diff>

<commit_message>
fix naming of the keywords
</commit_message>
<xml_diff>
--- a/Tutorials/whatiswot/13-Thing_Description/13-Thing_Description.pptx
+++ b/Tutorials/whatiswot/13-Thing_Description/13-Thing_Description.pptx
@@ -236,7 +236,7 @@
           <a:p>
             <a:fld id="{FD65C6DA-5C8D-412A-A384-5B74A29C9C75}" type="datetimeFigureOut">
               <a:rPr lang="en-US" smtClean="0"/>
-              <a:t>10/17/23</a:t>
+              <a:t>10/27/23</a:t>
             </a:fld>
             <a:endParaRPr lang="en-US"/>
           </a:p>
@@ -2243,7 +2243,7 @@
                 <a:latin typeface="Consolas" panose="020B0609020204030204" pitchFamily="49" charset="0"/>
                 <a:cs typeface="Consolas" panose="020B0609020204030204" pitchFamily="49" charset="0"/>
               </a:rPr>
-              <a:t>BrewMyCoffee</a:t>
+              <a:t>BrewCoffee</a:t>
             </a:r>
             <a:r>
               <a:rPr lang="en-US" sz="1200" dirty="0">
@@ -3900,7 +3900,7 @@
           <a:p>
             <a:fld id="{D154F9CB-E3D7-441A-A1FF-5C1CDFA7D5B3}" type="datetimeFigureOut">
               <a:rPr lang="en-US" smtClean="0"/>
-              <a:t>10/17/23</a:t>
+              <a:t>10/27/23</a:t>
             </a:fld>
             <a:endParaRPr lang="en-US"/>
           </a:p>
@@ -4070,7 +4070,7 @@
           <a:p>
             <a:fld id="{D154F9CB-E3D7-441A-A1FF-5C1CDFA7D5B3}" type="datetimeFigureOut">
               <a:rPr lang="en-US" smtClean="0"/>
-              <a:t>10/17/23</a:t>
+              <a:t>10/27/23</a:t>
             </a:fld>
             <a:endParaRPr lang="en-US"/>
           </a:p>
@@ -4250,7 +4250,7 @@
           <a:p>
             <a:fld id="{D154F9CB-E3D7-441A-A1FF-5C1CDFA7D5B3}" type="datetimeFigureOut">
               <a:rPr lang="en-US" smtClean="0"/>
-              <a:t>10/17/23</a:t>
+              <a:t>10/27/23</a:t>
             </a:fld>
             <a:endParaRPr lang="en-US"/>
           </a:p>
@@ -4420,7 +4420,7 @@
           <a:p>
             <a:fld id="{D154F9CB-E3D7-441A-A1FF-5C1CDFA7D5B3}" type="datetimeFigureOut">
               <a:rPr lang="en-US" smtClean="0"/>
-              <a:t>10/17/23</a:t>
+              <a:t>10/27/23</a:t>
             </a:fld>
             <a:endParaRPr lang="en-US"/>
           </a:p>
@@ -4666,7 +4666,7 @@
           <a:p>
             <a:fld id="{D154F9CB-E3D7-441A-A1FF-5C1CDFA7D5B3}" type="datetimeFigureOut">
               <a:rPr lang="en-US" smtClean="0"/>
-              <a:t>10/17/23</a:t>
+              <a:t>10/27/23</a:t>
             </a:fld>
             <a:endParaRPr lang="en-US"/>
           </a:p>
@@ -4898,7 +4898,7 @@
           <a:p>
             <a:fld id="{D154F9CB-E3D7-441A-A1FF-5C1CDFA7D5B3}" type="datetimeFigureOut">
               <a:rPr lang="en-US" smtClean="0"/>
-              <a:t>10/17/23</a:t>
+              <a:t>10/27/23</a:t>
             </a:fld>
             <a:endParaRPr lang="en-US"/>
           </a:p>
@@ -5265,7 +5265,7 @@
           <a:p>
             <a:fld id="{D154F9CB-E3D7-441A-A1FF-5C1CDFA7D5B3}" type="datetimeFigureOut">
               <a:rPr lang="en-US" smtClean="0"/>
-              <a:t>10/17/23</a:t>
+              <a:t>10/27/23</a:t>
             </a:fld>
             <a:endParaRPr lang="en-US"/>
           </a:p>
@@ -5383,7 +5383,7 @@
           <a:p>
             <a:fld id="{D154F9CB-E3D7-441A-A1FF-5C1CDFA7D5B3}" type="datetimeFigureOut">
               <a:rPr lang="en-US" smtClean="0"/>
-              <a:t>10/17/23</a:t>
+              <a:t>10/27/23</a:t>
             </a:fld>
             <a:endParaRPr lang="en-US"/>
           </a:p>
@@ -5478,7 +5478,7 @@
           <a:p>
             <a:fld id="{D154F9CB-E3D7-441A-A1FF-5C1CDFA7D5B3}" type="datetimeFigureOut">
               <a:rPr lang="en-US" smtClean="0"/>
-              <a:t>10/17/23</a:t>
+              <a:t>10/27/23</a:t>
             </a:fld>
             <a:endParaRPr lang="en-US"/>
           </a:p>
@@ -5755,7 +5755,7 @@
           <a:p>
             <a:fld id="{D154F9CB-E3D7-441A-A1FF-5C1CDFA7D5B3}" type="datetimeFigureOut">
               <a:rPr lang="en-US" smtClean="0"/>
-              <a:t>10/17/23</a:t>
+              <a:t>10/27/23</a:t>
             </a:fld>
             <a:endParaRPr lang="en-US"/>
           </a:p>
@@ -6011,7 +6011,7 @@
           <a:p>
             <a:fld id="{D154F9CB-E3D7-441A-A1FF-5C1CDFA7D5B3}" type="datetimeFigureOut">
               <a:rPr lang="en-US" smtClean="0"/>
-              <a:t>10/17/23</a:t>
+              <a:t>10/27/23</a:t>
             </a:fld>
             <a:endParaRPr lang="en-US"/>
           </a:p>
@@ -6229,7 +6229,7 @@
           <a:p>
             <a:fld id="{D154F9CB-E3D7-441A-A1FF-5C1CDFA7D5B3}" type="datetimeFigureOut">
               <a:rPr lang="en-US" smtClean="0"/>
-              <a:t>10/17/23</a:t>
+              <a:t>10/27/23</a:t>
             </a:fld>
             <a:endParaRPr lang="en-US"/>
           </a:p>
@@ -27294,8 +27294,8 @@
         </p:nvSpPr>
         <p:spPr>
           <a:xfrm>
-            <a:off x="6687430" y="2120181"/>
-            <a:ext cx="1708424" cy="461665"/>
+            <a:off x="6687429" y="2120181"/>
+            <a:ext cx="1866635" cy="461665"/>
           </a:xfrm>
           <a:prstGeom prst="rect">
             <a:avLst/>
@@ -27316,7 +27316,7 @@
                 <a:latin typeface="Consolas" panose="020B0609020204030204" pitchFamily="49" charset="0"/>
                 <a:cs typeface="Consolas" panose="020B0609020204030204" pitchFamily="49" charset="0"/>
               </a:rPr>
-              <a:t>WaterLeft</a:t>
+              <a:t>WaterLevel</a:t>
             </a:r>
             <a:endParaRPr lang="en-GB" sz="2400" b="0" dirty="0">
               <a:solidFill>
@@ -27342,8 +27342,8 @@
         </p:nvSpPr>
         <p:spPr>
           <a:xfrm>
-            <a:off x="9470167" y="2120181"/>
-            <a:ext cx="1567334" cy="461665"/>
+            <a:off x="9470166" y="2120181"/>
+            <a:ext cx="1708423" cy="461665"/>
           </a:xfrm>
           <a:prstGeom prst="rect">
             <a:avLst/>
@@ -27375,7 +27375,7 @@
                 <a:latin typeface="Consolas" panose="020B0609020204030204" pitchFamily="49" charset="0"/>
                 <a:cs typeface="Consolas" panose="020B0609020204030204" pitchFamily="49" charset="0"/>
               </a:rPr>
-              <a:t>eanLeft</a:t>
+              <a:t>eanLevel</a:t>
             </a:r>
             <a:endParaRPr lang="en-GB" sz="2400" b="0" dirty="0">
               <a:solidFill>
@@ -28914,7 +28914,7 @@
                 <a:latin typeface="Consolas" panose="020B0609020204030204" pitchFamily="49" charset="0"/>
                 <a:cs typeface="Consolas" panose="020B0609020204030204" pitchFamily="49" charset="0"/>
               </a:rPr>
-              <a:t>BrewMyCoffee</a:t>
+              <a:t>BrewCoffee</a:t>
             </a:r>
             <a:endParaRPr lang="en-GB" sz="2400" b="0" dirty="0">
               <a:solidFill>

</xml_diff>